<commit_message>
edit chapter5 ppt and txt
</commit_message>
<xml_diff>
--- a/draft/chapter5.pptx
+++ b/draft/chapter5.pptx
@@ -6,6 +6,8 @@
   </p:sldMasterIdLst>
   <p:sldIdLst>
     <p:sldId id="256" r:id="rId2"/>
+    <p:sldId id="257" r:id="rId3"/>
+    <p:sldId id="258" r:id="rId4"/>
   </p:sldIdLst>
   <p:sldSz cx="12192000" cy="6858000"/>
   <p:notesSz cx="6858000" cy="9144000"/>
@@ -104,6 +106,11 @@
       </a:defRPr>
     </a:lvl9pPr>
   </p:defaultTextStyle>
+  <p:extLst>
+    <p:ext uri="{EFAFB233-063F-42B5-8137-9DF3F51BA10A}">
+      <p15:sldGuideLst xmlns:p15="http://schemas.microsoft.com/office/powerpoint/2012/main"/>
+    </p:ext>
+  </p:extLst>
 </p:presentation>
 </file>
 
@@ -238,7 +245,7 @@
           <a:p>
             <a:fld id="{133C0493-C6ED-4B14-9A77-884F95215A8F}" type="datetimeFigureOut">
               <a:rPr lang="ko-KR" altLang="en-US" smtClean="0"/>
-              <a:t>2021-06-04</a:t>
+              <a:t>2021-07-07</a:t>
             </a:fld>
             <a:endParaRPr lang="ko-KR" altLang="en-US"/>
           </a:p>
@@ -408,7 +415,7 @@
           <a:p>
             <a:fld id="{133C0493-C6ED-4B14-9A77-884F95215A8F}" type="datetimeFigureOut">
               <a:rPr lang="ko-KR" altLang="en-US" smtClean="0"/>
-              <a:t>2021-06-04</a:t>
+              <a:t>2021-07-07</a:t>
             </a:fld>
             <a:endParaRPr lang="ko-KR" altLang="en-US"/>
           </a:p>
@@ -588,7 +595,7 @@
           <a:p>
             <a:fld id="{133C0493-C6ED-4B14-9A77-884F95215A8F}" type="datetimeFigureOut">
               <a:rPr lang="ko-KR" altLang="en-US" smtClean="0"/>
-              <a:t>2021-06-04</a:t>
+              <a:t>2021-07-07</a:t>
             </a:fld>
             <a:endParaRPr lang="ko-KR" altLang="en-US"/>
           </a:p>
@@ -758,7 +765,7 @@
           <a:p>
             <a:fld id="{133C0493-C6ED-4B14-9A77-884F95215A8F}" type="datetimeFigureOut">
               <a:rPr lang="ko-KR" altLang="en-US" smtClean="0"/>
-              <a:t>2021-06-04</a:t>
+              <a:t>2021-07-07</a:t>
             </a:fld>
             <a:endParaRPr lang="ko-KR" altLang="en-US"/>
           </a:p>
@@ -1004,7 +1011,7 @@
           <a:p>
             <a:fld id="{133C0493-C6ED-4B14-9A77-884F95215A8F}" type="datetimeFigureOut">
               <a:rPr lang="ko-KR" altLang="en-US" smtClean="0"/>
-              <a:t>2021-06-04</a:t>
+              <a:t>2021-07-07</a:t>
             </a:fld>
             <a:endParaRPr lang="ko-KR" altLang="en-US"/>
           </a:p>
@@ -1236,7 +1243,7 @@
           <a:p>
             <a:fld id="{133C0493-C6ED-4B14-9A77-884F95215A8F}" type="datetimeFigureOut">
               <a:rPr lang="ko-KR" altLang="en-US" smtClean="0"/>
-              <a:t>2021-06-04</a:t>
+              <a:t>2021-07-07</a:t>
             </a:fld>
             <a:endParaRPr lang="ko-KR" altLang="en-US"/>
           </a:p>
@@ -1603,7 +1610,7 @@
           <a:p>
             <a:fld id="{133C0493-C6ED-4B14-9A77-884F95215A8F}" type="datetimeFigureOut">
               <a:rPr lang="ko-KR" altLang="en-US" smtClean="0"/>
-              <a:t>2021-06-04</a:t>
+              <a:t>2021-07-07</a:t>
             </a:fld>
             <a:endParaRPr lang="ko-KR" altLang="en-US"/>
           </a:p>
@@ -1721,7 +1728,7 @@
           <a:p>
             <a:fld id="{133C0493-C6ED-4B14-9A77-884F95215A8F}" type="datetimeFigureOut">
               <a:rPr lang="ko-KR" altLang="en-US" smtClean="0"/>
-              <a:t>2021-06-04</a:t>
+              <a:t>2021-07-07</a:t>
             </a:fld>
             <a:endParaRPr lang="ko-KR" altLang="en-US"/>
           </a:p>
@@ -1816,7 +1823,7 @@
           <a:p>
             <a:fld id="{133C0493-C6ED-4B14-9A77-884F95215A8F}" type="datetimeFigureOut">
               <a:rPr lang="ko-KR" altLang="en-US" smtClean="0"/>
-              <a:t>2021-06-04</a:t>
+              <a:t>2021-07-07</a:t>
             </a:fld>
             <a:endParaRPr lang="ko-KR" altLang="en-US"/>
           </a:p>
@@ -2093,7 +2100,7 @@
           <a:p>
             <a:fld id="{133C0493-C6ED-4B14-9A77-884F95215A8F}" type="datetimeFigureOut">
               <a:rPr lang="ko-KR" altLang="en-US" smtClean="0"/>
-              <a:t>2021-06-04</a:t>
+              <a:t>2021-07-07</a:t>
             </a:fld>
             <a:endParaRPr lang="ko-KR" altLang="en-US"/>
           </a:p>
@@ -2346,7 +2353,7 @@
           <a:p>
             <a:fld id="{133C0493-C6ED-4B14-9A77-884F95215A8F}" type="datetimeFigureOut">
               <a:rPr lang="ko-KR" altLang="en-US" smtClean="0"/>
-              <a:t>2021-06-04</a:t>
+              <a:t>2021-07-07</a:t>
             </a:fld>
             <a:endParaRPr lang="ko-KR" altLang="en-US"/>
           </a:p>
@@ -2559,7 +2566,7 @@
           <a:p>
             <a:fld id="{133C0493-C6ED-4B14-9A77-884F95215A8F}" type="datetimeFigureOut">
               <a:rPr lang="ko-KR" altLang="en-US" smtClean="0"/>
-              <a:t>2021-06-04</a:t>
+              <a:t>2021-07-07</a:t>
             </a:fld>
             <a:endParaRPr lang="ko-KR" altLang="en-US"/>
           </a:p>
@@ -3171,7 +3178,11 @@
             <a:pPr algn="ctr"/>
             <a:r>
               <a:rPr lang="ko-KR" altLang="en-US" sz="1200" smtClean="0"/>
-              <a:t>문서 요약 레이어</a:t>
+              <a:t>질의응답 </a:t>
+            </a:r>
+            <a:r>
+              <a:rPr lang="ko-KR" altLang="en-US" sz="1200" smtClean="0"/>
+              <a:t>레이어</a:t>
             </a:r>
             <a:endParaRPr lang="ko-KR" altLang="en-US" sz="1200"/>
           </a:p>
@@ -3235,7 +3246,7 @@
         <p:spPr>
           <a:xfrm>
             <a:off x="6211494" y="4975654"/>
-            <a:ext cx="5614037" cy="830997"/>
+            <a:ext cx="5614037" cy="1384995"/>
           </a:xfrm>
           <a:prstGeom prst="rect">
             <a:avLst/>
@@ -3284,15 +3295,34 @@
           <a:p>
             <a:r>
               <a:rPr lang="en-US" altLang="ko-KR" sz="1200" smtClean="0"/>
-              <a:t>Label: </a:t>
-            </a:r>
+              <a:t>Question:</a:t>
+            </a:r>
+          </a:p>
+          <a:p>
             <a:r>
               <a:rPr lang="ko-KR" altLang="en-US" sz="1200" smtClean="0"/>
-              <a:t>정부는 빅데이터와 헬스케어 등의 사업에 신규 투자하기로 결정했다</a:t>
+              <a:t>정부가 투자하기로 한 사업은 무엇인가</a:t>
             </a:r>
             <a:r>
               <a:rPr lang="en-US" altLang="ko-KR" sz="1200" smtClean="0"/>
-              <a:t>.</a:t>
+              <a:t>?</a:t>
+            </a:r>
+            <a:endParaRPr lang="en-US" altLang="ko-KR" sz="1200" smtClean="0"/>
+          </a:p>
+          <a:p>
+            <a:r>
+              <a:rPr lang="en-US" altLang="ko-KR" sz="1200" smtClean="0"/>
+              <a:t>Label</a:t>
+            </a:r>
+            <a:r>
+              <a:rPr lang="en-US" altLang="ko-KR" sz="1200" smtClean="0"/>
+              <a:t>:</a:t>
+            </a:r>
+          </a:p>
+          <a:p>
+            <a:r>
+              <a:rPr lang="ko-KR" altLang="en-US" sz="1200" smtClean="0"/>
+              <a:t>빅데이터와 헬스케어</a:t>
             </a:r>
             <a:endParaRPr lang="ko-KR" altLang="en-US" sz="1200"/>
           </a:p>
@@ -3336,6 +3366,236 @@
     <p:extLst>
       <p:ext uri="{BB962C8B-B14F-4D97-AF65-F5344CB8AC3E}">
         <p14:creationId xmlns:p14="http://schemas.microsoft.com/office/powerpoint/2010/main" val="3156165366"/>
+      </p:ext>
+    </p:extLst>
+  </p:cSld>
+  <p:clrMapOvr>
+    <a:masterClrMapping/>
+  </p:clrMapOvr>
+</p:sld>
+</file>
+
+<file path=ppt/slides/slide2.xml><?xml version="1.0" encoding="utf-8"?>
+<p:sld xmlns:a="http://schemas.openxmlformats.org/drawingml/2006/main" xmlns:r="http://schemas.openxmlformats.org/officeDocument/2006/relationships" xmlns:p="http://schemas.openxmlformats.org/presentationml/2006/main">
+  <p:cSld>
+    <p:spTree>
+      <p:nvGrpSpPr>
+        <p:cNvPr id="1" name=""/>
+        <p:cNvGrpSpPr/>
+        <p:nvPr/>
+      </p:nvGrpSpPr>
+      <p:grpSpPr>
+        <a:xfrm>
+          <a:off x="0" y="0"/>
+          <a:ext cx="0" cy="0"/>
+          <a:chOff x="0" y="0"/>
+          <a:chExt cx="0" cy="0"/>
+        </a:xfrm>
+      </p:grpSpPr>
+      <p:pic>
+        <p:nvPicPr>
+          <p:cNvPr id="2" name="그림 1"/>
+          <p:cNvPicPr>
+            <a:picLocks noChangeAspect="1"/>
+          </p:cNvPicPr>
+          <p:nvPr/>
+        </p:nvPicPr>
+        <p:blipFill>
+          <a:blip r:embed="rId2"/>
+          <a:stretch>
+            <a:fillRect/>
+          </a:stretch>
+        </p:blipFill>
+        <p:spPr>
+          <a:xfrm>
+            <a:off x="0" y="2052865"/>
+            <a:ext cx="12192000" cy="2752269"/>
+          </a:xfrm>
+          <a:prstGeom prst="rect">
+            <a:avLst/>
+          </a:prstGeom>
+        </p:spPr>
+      </p:pic>
+      <p:sp>
+        <p:nvSpPr>
+          <p:cNvPr id="11" name="TextBox 10"/>
+          <p:cNvSpPr txBox="1"/>
+          <p:nvPr/>
+        </p:nvSpPr>
+        <p:spPr>
+          <a:xfrm>
+            <a:off x="59177" y="84986"/>
+            <a:ext cx="577402" cy="276999"/>
+          </a:xfrm>
+          <a:prstGeom prst="rect">
+            <a:avLst/>
+          </a:prstGeom>
+          <a:noFill/>
+        </p:spPr>
+        <p:txBody>
+          <a:bodyPr wrap="none" rtlCol="0">
+            <a:spAutoFit/>
+          </a:bodyPr>
+          <a:lstStyle/>
+          <a:p>
+            <a:r>
+              <a:rPr lang="ko-KR" altLang="en-US" sz="1200" smtClean="0"/>
+              <a:t>그림</a:t>
+            </a:r>
+            <a:r>
+              <a:rPr lang="en-US" altLang="ko-KR" sz="1200"/>
+              <a:t>2</a:t>
+            </a:r>
+            <a:endParaRPr lang="ko-KR" altLang="en-US" sz="1200"/>
+          </a:p>
+        </p:txBody>
+      </p:sp>
+    </p:spTree>
+    <p:extLst>
+      <p:ext uri="{BB962C8B-B14F-4D97-AF65-F5344CB8AC3E}">
+        <p14:creationId xmlns:p14="http://schemas.microsoft.com/office/powerpoint/2010/main" val="3547818004"/>
+      </p:ext>
+    </p:extLst>
+  </p:cSld>
+  <p:clrMapOvr>
+    <a:masterClrMapping/>
+  </p:clrMapOvr>
+</p:sld>
+</file>
+
+<file path=ppt/slides/slide3.xml><?xml version="1.0" encoding="utf-8"?>
+<p:sld xmlns:a="http://schemas.openxmlformats.org/drawingml/2006/main" xmlns:r="http://schemas.openxmlformats.org/officeDocument/2006/relationships" xmlns:p="http://schemas.openxmlformats.org/presentationml/2006/main">
+  <p:cSld>
+    <p:spTree>
+      <p:nvGrpSpPr>
+        <p:cNvPr id="1" name=""/>
+        <p:cNvGrpSpPr/>
+        <p:nvPr/>
+      </p:nvGrpSpPr>
+      <p:grpSpPr>
+        <a:xfrm>
+          <a:off x="0" y="0"/>
+          <a:ext cx="0" cy="0"/>
+          <a:chOff x="0" y="0"/>
+          <a:chExt cx="0" cy="0"/>
+        </a:xfrm>
+      </p:grpSpPr>
+      <p:pic>
+        <p:nvPicPr>
+          <p:cNvPr id="3" name="그림 2"/>
+          <p:cNvPicPr>
+            <a:picLocks noChangeAspect="1"/>
+          </p:cNvPicPr>
+          <p:nvPr/>
+        </p:nvPicPr>
+        <p:blipFill>
+          <a:blip r:embed="rId2"/>
+          <a:stretch>
+            <a:fillRect/>
+          </a:stretch>
+        </p:blipFill>
+        <p:spPr>
+          <a:xfrm>
+            <a:off x="3364771" y="-278341"/>
+            <a:ext cx="5260246" cy="4148324"/>
+          </a:xfrm>
+          <a:prstGeom prst="rect">
+            <a:avLst/>
+          </a:prstGeom>
+        </p:spPr>
+      </p:pic>
+      <p:pic>
+        <p:nvPicPr>
+          <p:cNvPr id="4" name="그림 3"/>
+          <p:cNvPicPr>
+            <a:picLocks noChangeAspect="1"/>
+          </p:cNvPicPr>
+          <p:nvPr/>
+        </p:nvPicPr>
+        <p:blipFill>
+          <a:blip r:embed="rId3"/>
+          <a:stretch>
+            <a:fillRect/>
+          </a:stretch>
+        </p:blipFill>
+        <p:spPr>
+          <a:xfrm>
+            <a:off x="3447148" y="4531517"/>
+            <a:ext cx="5405651" cy="2326483"/>
+          </a:xfrm>
+          <a:prstGeom prst="rect">
+            <a:avLst/>
+          </a:prstGeom>
+        </p:spPr>
+      </p:pic>
+      <p:sp>
+        <p:nvSpPr>
+          <p:cNvPr id="5" name="TextBox 4"/>
+          <p:cNvSpPr txBox="1"/>
+          <p:nvPr/>
+        </p:nvSpPr>
+        <p:spPr>
+          <a:xfrm>
+            <a:off x="6083553" y="3933703"/>
+            <a:ext cx="377428" cy="461665"/>
+          </a:xfrm>
+          <a:prstGeom prst="rect">
+            <a:avLst/>
+          </a:prstGeom>
+          <a:noFill/>
+        </p:spPr>
+        <p:txBody>
+          <a:bodyPr wrap="square" rtlCol="0">
+            <a:spAutoFit/>
+          </a:bodyPr>
+          <a:lstStyle/>
+          <a:p>
+            <a:r>
+              <a:rPr lang="en-US" altLang="ko-KR" sz="1200" smtClean="0"/>
+              <a:t>.......</a:t>
+            </a:r>
+            <a:endParaRPr lang="ko-KR" altLang="en-US" sz="1200"/>
+          </a:p>
+        </p:txBody>
+      </p:sp>
+      <p:sp>
+        <p:nvSpPr>
+          <p:cNvPr id="6" name="TextBox 5"/>
+          <p:cNvSpPr txBox="1"/>
+          <p:nvPr/>
+        </p:nvSpPr>
+        <p:spPr>
+          <a:xfrm>
+            <a:off x="59177" y="84986"/>
+            <a:ext cx="577402" cy="276999"/>
+          </a:xfrm>
+          <a:prstGeom prst="rect">
+            <a:avLst/>
+          </a:prstGeom>
+          <a:noFill/>
+        </p:spPr>
+        <p:txBody>
+          <a:bodyPr wrap="none" rtlCol="0">
+            <a:spAutoFit/>
+          </a:bodyPr>
+          <a:lstStyle/>
+          <a:p>
+            <a:r>
+              <a:rPr lang="ko-KR" altLang="en-US" sz="1200" smtClean="0"/>
+              <a:t>그림</a:t>
+            </a:r>
+            <a:r>
+              <a:rPr lang="en-US" altLang="ko-KR" sz="1200"/>
+              <a:t>3</a:t>
+            </a:r>
+            <a:endParaRPr lang="ko-KR" altLang="en-US" sz="1200"/>
+          </a:p>
+        </p:txBody>
+      </p:sp>
+    </p:spTree>
+    <p:extLst>
+      <p:ext uri="{BB962C8B-B14F-4D97-AF65-F5344CB8AC3E}">
+        <p14:creationId xmlns:p14="http://schemas.microsoft.com/office/powerpoint/2010/main" val="1633500803"/>
       </p:ext>
     </p:extLst>
   </p:cSld>

</xml_diff>